<commit_message>
Removed a duplicated slide (slide 6)
</commit_message>
<xml_diff>
--- a/Data Viz Assignment/Vaccines presentation.pptx
+++ b/Data Viz Assignment/Vaccines presentation.pptx
@@ -10,14 +10,13 @@
     <p:sldId id="257" r:id="rId4"/>
     <p:sldId id="259" r:id="rId5"/>
     <p:sldId id="269" r:id="rId6"/>
-    <p:sldId id="267" r:id="rId7"/>
-    <p:sldId id="270" r:id="rId8"/>
-    <p:sldId id="260" r:id="rId9"/>
-    <p:sldId id="261" r:id="rId10"/>
-    <p:sldId id="263" r:id="rId11"/>
-    <p:sldId id="264" r:id="rId12"/>
-    <p:sldId id="265" r:id="rId13"/>
-    <p:sldId id="266" r:id="rId14"/>
+    <p:sldId id="270" r:id="rId7"/>
+    <p:sldId id="260" r:id="rId8"/>
+    <p:sldId id="261" r:id="rId9"/>
+    <p:sldId id="263" r:id="rId10"/>
+    <p:sldId id="264" r:id="rId11"/>
+    <p:sldId id="265" r:id="rId12"/>
+    <p:sldId id="266" r:id="rId13"/>
   </p:sldIdLst>
   <p:sldSz cx="12192000" cy="6858000"/>
   <p:notesSz cx="6858000" cy="9144000"/>
@@ -3943,208 +3942,6 @@
             <a:r>
               <a:rPr lang="en-US" sz="3200" dirty="0">
                 <a:solidFill>
-                  <a:srgbClr val="C00000"/>
-                </a:solidFill>
-              </a:rPr>
-              <a:t>US / EU / UK</a:t>
-            </a:r>
-            <a:br>
-              <a:rPr lang="en-US" sz="3200" dirty="0">
-                <a:solidFill>
-                  <a:srgbClr val="C00000"/>
-                </a:solidFill>
-              </a:rPr>
-            </a:br>
-            <a:r>
-              <a:rPr lang="en-US" sz="2000" dirty="0">
-                <a:solidFill>
-                  <a:srgbClr val="C00000"/>
-                </a:solidFill>
-              </a:rPr>
-              <a:t>Pfizer / BNTX</a:t>
-            </a:r>
-            <a:br>
-              <a:rPr lang="en-US" sz="2000" dirty="0">
-                <a:solidFill>
-                  <a:srgbClr val="C00000"/>
-                </a:solidFill>
-              </a:rPr>
-            </a:br>
-            <a:r>
-              <a:rPr lang="en-US" sz="2000" dirty="0" err="1">
-                <a:solidFill>
-                  <a:srgbClr val="C00000"/>
-                </a:solidFill>
-              </a:rPr>
-              <a:t>Moderna</a:t>
-            </a:r>
-            <a:br>
-              <a:rPr lang="en-US" sz="2000" dirty="0">
-                <a:solidFill>
-                  <a:srgbClr val="C00000"/>
-                </a:solidFill>
-              </a:rPr>
-            </a:br>
-            <a:r>
-              <a:rPr lang="en-US" sz="2000" dirty="0" err="1">
-                <a:solidFill>
-                  <a:srgbClr val="C00000"/>
-                </a:solidFill>
-              </a:rPr>
-              <a:t>AstraZenica</a:t>
-            </a:r>
-            <a:br>
-              <a:rPr lang="en-US" sz="2000" dirty="0">
-                <a:solidFill>
-                  <a:srgbClr val="C00000"/>
-                </a:solidFill>
-              </a:rPr>
-            </a:br>
-            <a:r>
-              <a:rPr lang="en-US" sz="2000" dirty="0">
-                <a:solidFill>
-                  <a:srgbClr val="C00000"/>
-                </a:solidFill>
-              </a:rPr>
-              <a:t>Johnson &amp; Johnson</a:t>
-            </a:r>
-            <a:br>
-              <a:rPr lang="en-US" sz="2000" dirty="0">
-                <a:solidFill>
-                  <a:srgbClr val="C00000"/>
-                </a:solidFill>
-              </a:rPr>
-            </a:br>
-            <a:endParaRPr lang="en-US" sz="2000" dirty="0"/>
-          </a:p>
-        </p:txBody>
-      </p:sp>
-      <p:pic>
-        <p:nvPicPr>
-          <p:cNvPr id="5" name="Picture 2">
-            <a:extLst>
-              <a:ext uri="{FF2B5EF4-FFF2-40B4-BE49-F238E27FC236}">
-                <a16:creationId xmlns:a16="http://schemas.microsoft.com/office/drawing/2014/main" id="{667FD92E-F5CC-4A1D-AEB7-EE4198369569}"/>
-              </a:ext>
-            </a:extLst>
-          </p:cNvPr>
-          <p:cNvPicPr>
-            <a:picLocks noChangeAspect="1" noChangeArrowheads="1"/>
-          </p:cNvPicPr>
-          <p:nvPr/>
-        </p:nvPicPr>
-        <p:blipFill rotWithShape="1">
-          <a:blip r:embed="rId2">
-            <a:extLst>
-              <a:ext uri="{28A0092B-C50C-407E-A947-70E740481C1C}">
-                <a14:useLocalDpi xmlns:a14="http://schemas.microsoft.com/office/drawing/2010/main" val="0"/>
-              </a:ext>
-            </a:extLst>
-          </a:blip>
-          <a:srcRect b="62173"/>
-          <a:stretch/>
-        </p:blipFill>
-        <p:spPr bwMode="auto">
-          <a:xfrm>
-            <a:off x="1280161" y="1566234"/>
-            <a:ext cx="8685759" cy="4747481"/>
-          </a:xfrm>
-          <a:prstGeom prst="rect">
-            <a:avLst/>
-          </a:prstGeom>
-          <a:noFill/>
-          <a:extLst>
-            <a:ext uri="{909E8E84-426E-40DD-AFC4-6F175D3DCCD1}">
-              <a14:hiddenFill xmlns:a14="http://schemas.microsoft.com/office/drawing/2010/main">
-                <a:solidFill>
-                  <a:srgbClr val="FFFFFF"/>
-                </a:solidFill>
-              </a14:hiddenFill>
-            </a:ext>
-          </a:extLst>
-        </p:spPr>
-      </p:pic>
-      <p:sp>
-        <p:nvSpPr>
-          <p:cNvPr id="3" name="Content Placeholder 2">
-            <a:extLst>
-              <a:ext uri="{FF2B5EF4-FFF2-40B4-BE49-F238E27FC236}">
-                <a16:creationId xmlns:a16="http://schemas.microsoft.com/office/drawing/2014/main" id="{B1FF1D46-032D-491B-A0E2-E4CA221A48F9}"/>
-              </a:ext>
-            </a:extLst>
-          </p:cNvPr>
-          <p:cNvSpPr>
-            <a:spLocks noGrp="1"/>
-          </p:cNvSpPr>
-          <p:nvPr>
-            <p:ph idx="1"/>
-          </p:nvPr>
-        </p:nvSpPr>
-        <p:spPr/>
-        <p:txBody>
-          <a:bodyPr/>
-          <a:lstStyle/>
-          <a:p>
-            <a:endParaRPr lang="en-US" dirty="0"/>
-          </a:p>
-        </p:txBody>
-      </p:sp>
-    </p:spTree>
-    <p:extLst>
-      <p:ext uri="{BB962C8B-B14F-4D97-AF65-F5344CB8AC3E}">
-        <p14:creationId xmlns:p14="http://schemas.microsoft.com/office/powerpoint/2010/main" val="1375394927"/>
-      </p:ext>
-    </p:extLst>
-  </p:cSld>
-  <p:clrMapOvr>
-    <a:masterClrMapping/>
-  </p:clrMapOvr>
-</p:sld>
-</file>
-
-<file path=ppt/slides/slide11.xml><?xml version="1.0" encoding="utf-8"?>
-<p:sld xmlns:a="http://schemas.openxmlformats.org/drawingml/2006/main" xmlns:r="http://schemas.openxmlformats.org/officeDocument/2006/relationships" xmlns:p="http://schemas.openxmlformats.org/presentationml/2006/main">
-  <p:cSld>
-    <p:spTree>
-      <p:nvGrpSpPr>
-        <p:cNvPr id="1" name=""/>
-        <p:cNvGrpSpPr/>
-        <p:nvPr/>
-      </p:nvGrpSpPr>
-      <p:grpSpPr>
-        <a:xfrm>
-          <a:off x="0" y="0"/>
-          <a:ext cx="0" cy="0"/>
-          <a:chOff x="0" y="0"/>
-          <a:chExt cx="0" cy="0"/>
-        </a:xfrm>
-      </p:grpSpPr>
-      <p:sp>
-        <p:nvSpPr>
-          <p:cNvPr id="2" name="Title 1">
-            <a:extLst>
-              <a:ext uri="{FF2B5EF4-FFF2-40B4-BE49-F238E27FC236}">
-                <a16:creationId xmlns:a16="http://schemas.microsoft.com/office/drawing/2014/main" id="{520DB380-56C0-4E84-9ABE-F434C9CD1AAE}"/>
-              </a:ext>
-            </a:extLst>
-          </p:cNvPr>
-          <p:cNvSpPr>
-            <a:spLocks noGrp="1"/>
-          </p:cNvSpPr>
-          <p:nvPr>
-            <p:ph type="title"/>
-          </p:nvPr>
-        </p:nvSpPr>
-        <p:spPr/>
-        <p:txBody>
-          <a:bodyPr>
-            <a:noAutofit/>
-          </a:bodyPr>
-          <a:lstStyle/>
-          <a:p>
-            <a:r>
-              <a:rPr lang="en-US" sz="3200" dirty="0">
-                <a:solidFill>
                   <a:srgbClr val="7030A0"/>
                 </a:solidFill>
               </a:rPr>
@@ -4358,7 +4155,7 @@
 </p:sld>
 </file>
 
-<file path=ppt/slides/slide12.xml><?xml version="1.0" encoding="utf-8"?>
+<file path=ppt/slides/slide11.xml><?xml version="1.0" encoding="utf-8"?>
 <p:sld xmlns:a="http://schemas.openxmlformats.org/drawingml/2006/main" xmlns:r="http://schemas.openxmlformats.org/officeDocument/2006/relationships" xmlns:p="http://schemas.openxmlformats.org/presentationml/2006/main">
   <p:cSld>
     <p:spTree>
@@ -4610,7 +4407,7 @@
 </p:sld>
 </file>
 
-<file path=ppt/slides/slide13.xml><?xml version="1.0" encoding="utf-8"?>
+<file path=ppt/slides/slide12.xml><?xml version="1.0" encoding="utf-8"?>
 <p:sld xmlns:a="http://schemas.openxmlformats.org/drawingml/2006/main" xmlns:r="http://schemas.openxmlformats.org/officeDocument/2006/relationships" xmlns:p="http://schemas.openxmlformats.org/presentationml/2006/main">
   <p:cSld>
     <p:spTree>
@@ -6919,7 +6716,7 @@
         </p:nvSpPr>
         <p:spPr bwMode="auto">
           <a:xfrm>
-            <a:off x="6904429" y="5935718"/>
+            <a:off x="832696" y="5760047"/>
             <a:ext cx="3962337" cy="461665"/>
           </a:xfrm>
           <a:prstGeom prst="rect">
@@ -7123,7 +6920,7 @@
         </p:blipFill>
         <p:spPr bwMode="auto">
           <a:xfrm>
-            <a:off x="348267" y="239807"/>
+            <a:off x="6397572" y="168786"/>
             <a:ext cx="5221680" cy="5278437"/>
           </a:xfrm>
           <a:prstGeom prst="rect">
@@ -7170,7 +6967,7 @@
         </p:blipFill>
         <p:spPr bwMode="auto">
           <a:xfrm>
-            <a:off x="6448155" y="475013"/>
+            <a:off x="376422" y="299342"/>
             <a:ext cx="5393587" cy="3561803"/>
           </a:xfrm>
           <a:prstGeom prst="rect">
@@ -7202,7 +6999,7 @@
         </p:nvSpPr>
         <p:spPr>
           <a:xfrm>
-            <a:off x="6775268" y="4165707"/>
+            <a:off x="703535" y="3990036"/>
             <a:ext cx="984070" cy="400110"/>
           </a:xfrm>
           <a:prstGeom prst="rect">
@@ -7251,7 +7048,7 @@
         </p:nvSpPr>
         <p:spPr>
           <a:xfrm>
-            <a:off x="7759338" y="4165707"/>
+            <a:off x="1687605" y="3990036"/>
             <a:ext cx="984070" cy="246221"/>
           </a:xfrm>
           <a:prstGeom prst="rect">
@@ -7290,7 +7087,7 @@
         </p:nvSpPr>
         <p:spPr>
           <a:xfrm>
-            <a:off x="8573995" y="4172199"/>
+            <a:off x="2502262" y="3996528"/>
             <a:ext cx="623207" cy="246221"/>
           </a:xfrm>
           <a:prstGeom prst="rect">
@@ -7329,7 +7126,7 @@
         </p:nvSpPr>
         <p:spPr>
           <a:xfrm>
-            <a:off x="9223663" y="4165707"/>
+            <a:off x="3151930" y="3990036"/>
             <a:ext cx="1067487" cy="707886"/>
           </a:xfrm>
           <a:prstGeom prst="rect">
@@ -7392,7 +7189,7 @@
         </p:nvSpPr>
         <p:spPr>
           <a:xfrm>
-            <a:off x="10040703" y="4172199"/>
+            <a:off x="3968970" y="3996528"/>
             <a:ext cx="908548" cy="400110"/>
           </a:xfrm>
           <a:prstGeom prst="rect">
@@ -7442,7 +7239,7 @@
         </p:nvSpPr>
         <p:spPr>
           <a:xfrm>
-            <a:off x="10898089" y="4178691"/>
+            <a:off x="4826356" y="4003020"/>
             <a:ext cx="1067486" cy="400110"/>
           </a:xfrm>
           <a:prstGeom prst="rect">
@@ -7768,7 +7565,7 @@
         </p:nvSpPr>
         <p:spPr>
           <a:xfrm>
-            <a:off x="6901809" y="5019373"/>
+            <a:off x="830076" y="4843702"/>
             <a:ext cx="3842995" cy="584775"/>
           </a:xfrm>
           <a:prstGeom prst="rect">
@@ -7818,7 +7615,7 @@
         </p:nvSpPr>
         <p:spPr>
           <a:xfrm>
-            <a:off x="265976" y="5496822"/>
+            <a:off x="6315281" y="5425801"/>
             <a:ext cx="5735329" cy="1323439"/>
           </a:xfrm>
           <a:prstGeom prst="rect">
@@ -7855,7 +7652,7 @@
           <a:p>
             <a:r>
               <a:rPr lang="en-US" sz="1600" b="1" dirty="0"/>
-              <a:t>Only 5/19 jurisdictions approved vaccines from both America/Europe and Asia:</a:t>
+              <a:t>Only 5 out of 19 jurisdictions approved vaccines from both America/Europe and Asia:</a:t>
             </a:r>
           </a:p>
           <a:p>
@@ -7873,7 +7670,7 @@
     </p:spTree>
     <p:extLst>
       <p:ext uri="{BB962C8B-B14F-4D97-AF65-F5344CB8AC3E}">
-        <p14:creationId xmlns:p14="http://schemas.microsoft.com/office/powerpoint/2010/main" val="3815549023"/>
+        <p14:creationId xmlns:p14="http://schemas.microsoft.com/office/powerpoint/2010/main" val="3616281270"/>
       </p:ext>
     </p:extLst>
   </p:cSld>
@@ -7902,1005 +7699,6 @@
       </p:grpSpPr>
       <p:sp>
         <p:nvSpPr>
-          <p:cNvPr id="4" name="Rectangle 1">
-            <a:extLst>
-              <a:ext uri="{FF2B5EF4-FFF2-40B4-BE49-F238E27FC236}">
-                <a16:creationId xmlns:a16="http://schemas.microsoft.com/office/drawing/2014/main" id="{20EE3BB7-B671-4A61-B577-7A30C64D3471}"/>
-              </a:ext>
-            </a:extLst>
-          </p:cNvPr>
-          <p:cNvSpPr>
-            <a:spLocks noGrp="1" noChangeArrowheads="1"/>
-          </p:cNvSpPr>
-          <p:nvPr>
-            <p:ph type="title"/>
-          </p:nvPr>
-        </p:nvSpPr>
-        <p:spPr bwMode="auto">
-          <a:xfrm>
-            <a:off x="832696" y="5760047"/>
-            <a:ext cx="3962337" cy="461665"/>
-          </a:xfrm>
-          <a:prstGeom prst="rect">
-            <a:avLst/>
-          </a:prstGeom>
-          <a:solidFill>
-            <a:srgbClr val="FFFFFF"/>
-          </a:solidFill>
-          <a:ln>
-            <a:noFill/>
-          </a:ln>
-          <a:effectLst/>
-          <a:extLst>
-            <a:ext uri="{91240B29-F687-4F45-9708-019B960494DF}">
-              <a14:hiddenLine xmlns:a14="http://schemas.microsoft.com/office/drawing/2010/main" w="9525">
-                <a:solidFill>
-                  <a:schemeClr val="tx1"/>
-                </a:solidFill>
-                <a:miter lim="800000"/>
-                <a:headEnd/>
-                <a:tailEnd/>
-              </a14:hiddenLine>
-            </a:ext>
-            <a:ext uri="{AF507438-7753-43E0-B8FC-AC1667EBCBE1}">
-              <a14:hiddenEffects xmlns:a14="http://schemas.microsoft.com/office/drawing/2010/main">
-                <a:effectLst>
-                  <a:outerShdw dist="35921" dir="2700000" algn="ctr" rotWithShape="0">
-                    <a:schemeClr val="bg2"/>
-                  </a:outerShdw>
-                </a:effectLst>
-              </a14:hiddenEffects>
-            </a:ext>
-          </a:extLst>
-        </p:spPr>
-        <p:txBody>
-          <a:bodyPr vert="horz" wrap="square" lIns="0" tIns="0" rIns="0" bIns="0" numCol="1" anchor="ctr" anchorCtr="0" compatLnSpc="1">
-            <a:prstTxWarp prst="textNoShape">
-              <a:avLst/>
-            </a:prstTxWarp>
-            <a:spAutoFit/>
-          </a:bodyPr>
-          <a:lstStyle/>
-          <a:p>
-            <a:pPr marL="0" marR="0" lvl="0" indent="0" algn="l" defTabSz="914400" rtl="0" eaLnBrk="0" fontAlgn="base" latinLnBrk="0" hangingPunct="0">
-              <a:lnSpc>
-                <a:spcPct val="100000"/>
-              </a:lnSpc>
-              <a:spcBef>
-                <a:spcPct val="0"/>
-              </a:spcBef>
-              <a:spcAft>
-                <a:spcPct val="0"/>
-              </a:spcAft>
-              <a:buClrTx/>
-              <a:buSzTx/>
-              <a:buFontTx/>
-              <a:buNone/>
-              <a:tabLst/>
-            </a:pPr>
-            <a:r>
-              <a:rPr kumimoji="0" lang="en-US" altLang="en-US" sz="1000" b="0" i="0" u="none" strike="noStrike" cap="none" normalizeH="0" baseline="0" dirty="0">
-                <a:ln>
-                  <a:noFill/>
-                </a:ln>
-                <a:solidFill>
-                  <a:schemeClr val="tx1"/>
-                </a:solidFill>
-                <a:effectLst/>
-                <a:latin typeface="var(--jp-code-font-family)"/>
-              </a:rPr>
-              <a:t>VACCINES : APPROVALS</a:t>
-            </a:r>
-            <a:br>
-              <a:rPr kumimoji="0" lang="en-US" altLang="en-US" sz="1000" b="0" i="0" u="none" strike="noStrike" cap="none" normalizeH="0" baseline="0" dirty="0">
-                <a:ln>
-                  <a:noFill/>
-                </a:ln>
-                <a:solidFill>
-                  <a:schemeClr val="tx1"/>
-                </a:solidFill>
-                <a:effectLst/>
-                <a:latin typeface="var(--jp-code-font-family)"/>
-              </a:rPr>
-            </a:br>
-            <a:r>
-              <a:rPr kumimoji="0" lang="en-US" altLang="en-US" sz="1000" b="0" i="0" u="none" strike="noStrike" cap="none" normalizeH="0" baseline="0" dirty="0">
-                <a:ln>
-                  <a:noFill/>
-                </a:ln>
-                <a:solidFill>
-                  <a:schemeClr val="tx1"/>
-                </a:solidFill>
-                <a:effectLst/>
-                <a:latin typeface="var(--jp-code-font-family)"/>
-              </a:rPr>
-              <a:t>{'PFE / BNTX': 12, 'MRNA': 5, 'AZN': 13, 'JNJ': 4, 'SVA': 6, 'SHTDY_1': 1, 'SHTDY_2': 1, '</a:t>
-            </a:r>
-            <a:r>
-              <a:rPr kumimoji="0" lang="en-US" altLang="en-US" sz="1000" b="0" i="0" u="none" strike="noStrike" cap="none" normalizeH="0" baseline="0" dirty="0" err="1">
-                <a:ln>
-                  <a:noFill/>
-                </a:ln>
-                <a:solidFill>
-                  <a:schemeClr val="tx1"/>
-                </a:solidFill>
-                <a:effectLst/>
-                <a:latin typeface="var(--jp-code-font-family)"/>
-              </a:rPr>
-              <a:t>CanSino</a:t>
-            </a:r>
-            <a:r>
-              <a:rPr kumimoji="0" lang="en-US" altLang="en-US" sz="1000" b="0" i="0" u="none" strike="noStrike" cap="none" normalizeH="0" baseline="0" dirty="0">
-                <a:ln>
-                  <a:noFill/>
-                </a:ln>
-                <a:solidFill>
-                  <a:schemeClr val="tx1"/>
-                </a:solidFill>
-                <a:effectLst/>
-                <a:latin typeface="var(--jp-code-font-family)"/>
-              </a:rPr>
-              <a:t>': 2, 'BIBCL.BO': 1, 'Sputnik V': 2, '</a:t>
-            </a:r>
-            <a:r>
-              <a:rPr kumimoji="0" lang="en-US" altLang="en-US" sz="1000" b="0" i="0" u="none" strike="noStrike" cap="none" normalizeH="0" baseline="0" dirty="0" err="1">
-                <a:ln>
-                  <a:noFill/>
-                </a:ln>
-                <a:solidFill>
-                  <a:schemeClr val="tx1"/>
-                </a:solidFill>
-                <a:effectLst/>
-                <a:latin typeface="var(--jp-code-font-family)"/>
-              </a:rPr>
-              <a:t>CoviVac</a:t>
-            </a:r>
-            <a:r>
-              <a:rPr kumimoji="0" lang="en-US" altLang="en-US" sz="1000" b="0" i="0" u="none" strike="noStrike" cap="none" normalizeH="0" baseline="0" dirty="0">
-                <a:ln>
-                  <a:noFill/>
-                </a:ln>
-                <a:solidFill>
-                  <a:schemeClr val="tx1"/>
-                </a:solidFill>
-                <a:effectLst/>
-                <a:latin typeface="var(--jp-code-font-family)"/>
-              </a:rPr>
-              <a:t>': 1}</a:t>
-            </a:r>
-            <a:r>
-              <a:rPr kumimoji="0" lang="en-US" altLang="en-US" sz="800" b="0" i="0" u="none" strike="noStrike" cap="none" normalizeH="0" baseline="0" dirty="0">
-                <a:ln>
-                  <a:noFill/>
-                </a:ln>
-                <a:solidFill>
-                  <a:schemeClr val="tx1"/>
-                </a:solidFill>
-                <a:effectLst/>
-              </a:rPr>
-              <a:t> </a:t>
-            </a:r>
-            <a:endParaRPr kumimoji="0" lang="en-US" altLang="en-US" sz="1800" b="0" i="0" u="none" strike="noStrike" cap="none" normalizeH="0" baseline="0" dirty="0">
-              <a:ln>
-                <a:noFill/>
-              </a:ln>
-              <a:solidFill>
-                <a:schemeClr val="tx1"/>
-              </a:solidFill>
-              <a:effectLst/>
-              <a:latin typeface="Arial" panose="020B0604020202020204" pitchFamily="34" charset="0"/>
-            </a:endParaRPr>
-          </a:p>
-        </p:txBody>
-      </p:sp>
-      <p:pic>
-        <p:nvPicPr>
-          <p:cNvPr id="2053" name="Picture 5">
-            <a:extLst>
-              <a:ext uri="{FF2B5EF4-FFF2-40B4-BE49-F238E27FC236}">
-                <a16:creationId xmlns:a16="http://schemas.microsoft.com/office/drawing/2014/main" id="{B7958D41-6B66-4E96-93AF-D009465C46DB}"/>
-              </a:ext>
-            </a:extLst>
-          </p:cNvPr>
-          <p:cNvPicPr>
-            <a:picLocks noChangeAspect="1" noChangeArrowheads="1"/>
-          </p:cNvPicPr>
-          <p:nvPr/>
-        </p:nvPicPr>
-        <p:blipFill>
-          <a:blip r:embed="rId2">
-            <a:extLst>
-              <a:ext uri="{28A0092B-C50C-407E-A947-70E740481C1C}">
-                <a14:useLocalDpi xmlns:a14="http://schemas.microsoft.com/office/drawing/2010/main" val="0"/>
-              </a:ext>
-            </a:extLst>
-          </a:blip>
-          <a:srcRect/>
-          <a:stretch>
-            <a:fillRect/>
-          </a:stretch>
-        </p:blipFill>
-        <p:spPr bwMode="auto">
-          <a:xfrm>
-            <a:off x="6397572" y="168786"/>
-            <a:ext cx="5221680" cy="5278437"/>
-          </a:xfrm>
-          <a:prstGeom prst="rect">
-            <a:avLst/>
-          </a:prstGeom>
-          <a:noFill/>
-          <a:extLst>
-            <a:ext uri="{909E8E84-426E-40DD-AFC4-6F175D3DCCD1}">
-              <a14:hiddenFill xmlns:a14="http://schemas.microsoft.com/office/drawing/2010/main">
-                <a:solidFill>
-                  <a:srgbClr val="FFFFFF"/>
-                </a:solidFill>
-              </a14:hiddenFill>
-            </a:ext>
-          </a:extLst>
-        </p:spPr>
-      </p:pic>
-      <p:pic>
-        <p:nvPicPr>
-          <p:cNvPr id="12290" name="Picture 2">
-            <a:extLst>
-              <a:ext uri="{FF2B5EF4-FFF2-40B4-BE49-F238E27FC236}">
-                <a16:creationId xmlns:a16="http://schemas.microsoft.com/office/drawing/2014/main" id="{93EE0D24-1A8F-4532-AE16-66AA1A96347B}"/>
-              </a:ext>
-            </a:extLst>
-          </p:cNvPr>
-          <p:cNvPicPr>
-            <a:picLocks noChangeAspect="1" noChangeArrowheads="1"/>
-          </p:cNvPicPr>
-          <p:nvPr/>
-        </p:nvPicPr>
-        <p:blipFill>
-          <a:blip r:embed="rId3">
-            <a:extLst>
-              <a:ext uri="{28A0092B-C50C-407E-A947-70E740481C1C}">
-                <a14:useLocalDpi xmlns:a14="http://schemas.microsoft.com/office/drawing/2010/main" val="0"/>
-              </a:ext>
-            </a:extLst>
-          </a:blip>
-          <a:srcRect/>
-          <a:stretch>
-            <a:fillRect/>
-          </a:stretch>
-        </p:blipFill>
-        <p:spPr bwMode="auto">
-          <a:xfrm>
-            <a:off x="376422" y="299342"/>
-            <a:ext cx="5393587" cy="3561803"/>
-          </a:xfrm>
-          <a:prstGeom prst="rect">
-            <a:avLst/>
-          </a:prstGeom>
-          <a:noFill/>
-          <a:extLst>
-            <a:ext uri="{909E8E84-426E-40DD-AFC4-6F175D3DCCD1}">
-              <a14:hiddenFill xmlns:a14="http://schemas.microsoft.com/office/drawing/2010/main">
-                <a:solidFill>
-                  <a:srgbClr val="FFFFFF"/>
-                </a:solidFill>
-              </a14:hiddenFill>
-            </a:ext>
-          </a:extLst>
-        </p:spPr>
-      </p:pic>
-      <p:sp>
-        <p:nvSpPr>
-          <p:cNvPr id="6" name="TextBox 5">
-            <a:extLst>
-              <a:ext uri="{FF2B5EF4-FFF2-40B4-BE49-F238E27FC236}">
-                <a16:creationId xmlns:a16="http://schemas.microsoft.com/office/drawing/2014/main" id="{4E84CFCA-AAF7-4B5A-9D1F-7535AE0754CE}"/>
-              </a:ext>
-            </a:extLst>
-          </p:cNvPr>
-          <p:cNvSpPr txBox="1"/>
-          <p:nvPr/>
-        </p:nvSpPr>
-        <p:spPr>
-          <a:xfrm>
-            <a:off x="703535" y="3990036"/>
-            <a:ext cx="984070" cy="400110"/>
-          </a:xfrm>
-          <a:prstGeom prst="rect">
-            <a:avLst/>
-          </a:prstGeom>
-          <a:noFill/>
-        </p:spPr>
-        <p:txBody>
-          <a:bodyPr wrap="square" rtlCol="0">
-            <a:spAutoFit/>
-          </a:bodyPr>
-          <a:lstStyle/>
-          <a:p>
-            <a:pPr marL="171450" indent="-171450">
-              <a:buFont typeface="Arial" panose="020B0604020202020204" pitchFamily="34" charset="0"/>
-              <a:buChar char="•"/>
-            </a:pPr>
-            <a:r>
-              <a:rPr lang="en-US" sz="1000" dirty="0"/>
-              <a:t>PFE/BNTX</a:t>
-            </a:r>
-          </a:p>
-          <a:p>
-            <a:pPr marL="171450" indent="-171450">
-              <a:buFont typeface="Arial" panose="020B0604020202020204" pitchFamily="34" charset="0"/>
-              <a:buChar char="•"/>
-            </a:pPr>
-            <a:r>
-              <a:rPr lang="en-US" sz="1000" dirty="0"/>
-              <a:t>JNJ</a:t>
-            </a:r>
-          </a:p>
-        </p:txBody>
-      </p:sp>
-      <p:sp>
-        <p:nvSpPr>
-          <p:cNvPr id="10" name="TextBox 9">
-            <a:extLst>
-              <a:ext uri="{FF2B5EF4-FFF2-40B4-BE49-F238E27FC236}">
-                <a16:creationId xmlns:a16="http://schemas.microsoft.com/office/drawing/2014/main" id="{73AB1EA1-C94B-438D-A3C4-4FA92D856097}"/>
-              </a:ext>
-            </a:extLst>
-          </p:cNvPr>
-          <p:cNvSpPr txBox="1"/>
-          <p:nvPr/>
-        </p:nvSpPr>
-        <p:spPr>
-          <a:xfrm>
-            <a:off x="1687605" y="3990036"/>
-            <a:ext cx="984070" cy="246221"/>
-          </a:xfrm>
-          <a:prstGeom prst="rect">
-            <a:avLst/>
-          </a:prstGeom>
-          <a:noFill/>
-        </p:spPr>
-        <p:txBody>
-          <a:bodyPr wrap="square" rtlCol="0">
-            <a:spAutoFit/>
-          </a:bodyPr>
-          <a:lstStyle/>
-          <a:p>
-            <a:pPr marL="171450" indent="-171450">
-              <a:buFont typeface="Arial" panose="020B0604020202020204" pitchFamily="34" charset="0"/>
-              <a:buChar char="•"/>
-            </a:pPr>
-            <a:r>
-              <a:rPr lang="en-US" sz="1000" dirty="0"/>
-              <a:t>MRNA</a:t>
-            </a:r>
-          </a:p>
-        </p:txBody>
-      </p:sp>
-      <p:sp>
-        <p:nvSpPr>
-          <p:cNvPr id="11" name="TextBox 10">
-            <a:extLst>
-              <a:ext uri="{FF2B5EF4-FFF2-40B4-BE49-F238E27FC236}">
-                <a16:creationId xmlns:a16="http://schemas.microsoft.com/office/drawing/2014/main" id="{3A3E1C3C-40C1-4656-9E4B-ED21B687D6CD}"/>
-              </a:ext>
-            </a:extLst>
-          </p:cNvPr>
-          <p:cNvSpPr txBox="1"/>
-          <p:nvPr/>
-        </p:nvSpPr>
-        <p:spPr>
-          <a:xfrm>
-            <a:off x="2502262" y="3996528"/>
-            <a:ext cx="623207" cy="246221"/>
-          </a:xfrm>
-          <a:prstGeom prst="rect">
-            <a:avLst/>
-          </a:prstGeom>
-          <a:noFill/>
-        </p:spPr>
-        <p:txBody>
-          <a:bodyPr wrap="square" rtlCol="0">
-            <a:spAutoFit/>
-          </a:bodyPr>
-          <a:lstStyle/>
-          <a:p>
-            <a:pPr marL="171450" indent="-171450">
-              <a:buFont typeface="Arial" panose="020B0604020202020204" pitchFamily="34" charset="0"/>
-              <a:buChar char="•"/>
-            </a:pPr>
-            <a:r>
-              <a:rPr lang="en-US" sz="1000" dirty="0"/>
-              <a:t>AZN</a:t>
-            </a:r>
-          </a:p>
-        </p:txBody>
-      </p:sp>
-      <p:sp>
-        <p:nvSpPr>
-          <p:cNvPr id="12" name="TextBox 11">
-            <a:extLst>
-              <a:ext uri="{FF2B5EF4-FFF2-40B4-BE49-F238E27FC236}">
-                <a16:creationId xmlns:a16="http://schemas.microsoft.com/office/drawing/2014/main" id="{68A3E5F7-A25E-400C-B263-AA7AD76A770D}"/>
-              </a:ext>
-            </a:extLst>
-          </p:cNvPr>
-          <p:cNvSpPr txBox="1"/>
-          <p:nvPr/>
-        </p:nvSpPr>
-        <p:spPr>
-          <a:xfrm>
-            <a:off x="3151930" y="3990036"/>
-            <a:ext cx="1067487" cy="707886"/>
-          </a:xfrm>
-          <a:prstGeom prst="rect">
-            <a:avLst/>
-          </a:prstGeom>
-          <a:noFill/>
-        </p:spPr>
-        <p:txBody>
-          <a:bodyPr wrap="square" rtlCol="0">
-            <a:spAutoFit/>
-          </a:bodyPr>
-          <a:lstStyle/>
-          <a:p>
-            <a:pPr marL="171450" indent="-171450">
-              <a:buFont typeface="Arial" panose="020B0604020202020204" pitchFamily="34" charset="0"/>
-              <a:buChar char="•"/>
-            </a:pPr>
-            <a:r>
-              <a:rPr lang="en-US" sz="1000" dirty="0"/>
-              <a:t>SVA</a:t>
-            </a:r>
-          </a:p>
-          <a:p>
-            <a:pPr marL="171450" indent="-171450">
-              <a:buFont typeface="Arial" panose="020B0604020202020204" pitchFamily="34" charset="0"/>
-              <a:buChar char="•"/>
-            </a:pPr>
-            <a:r>
-              <a:rPr lang="en-US" sz="1000" dirty="0"/>
-              <a:t>SHTDY</a:t>
-            </a:r>
-          </a:p>
-          <a:p>
-            <a:pPr marL="171450" indent="-171450">
-              <a:buFont typeface="Arial" panose="020B0604020202020204" pitchFamily="34" charset="0"/>
-              <a:buChar char="•"/>
-            </a:pPr>
-            <a:r>
-              <a:rPr lang="en-US" sz="1000" dirty="0" err="1"/>
-              <a:t>CanSino</a:t>
-            </a:r>
-            <a:r>
-              <a:rPr lang="en-US" sz="1000" dirty="0"/>
-              <a:t> (6185.HK)</a:t>
-            </a:r>
-          </a:p>
-        </p:txBody>
-      </p:sp>
-      <p:sp>
-        <p:nvSpPr>
-          <p:cNvPr id="13" name="TextBox 12">
-            <a:extLst>
-              <a:ext uri="{FF2B5EF4-FFF2-40B4-BE49-F238E27FC236}">
-                <a16:creationId xmlns:a16="http://schemas.microsoft.com/office/drawing/2014/main" id="{A1FD4CC8-C6B7-448F-91F8-F6D9BCA0F0B2}"/>
-              </a:ext>
-            </a:extLst>
-          </p:cNvPr>
-          <p:cNvSpPr txBox="1"/>
-          <p:nvPr/>
-        </p:nvSpPr>
-        <p:spPr>
-          <a:xfrm>
-            <a:off x="3968970" y="3996528"/>
-            <a:ext cx="908548" cy="400110"/>
-          </a:xfrm>
-          <a:prstGeom prst="rect">
-            <a:avLst/>
-          </a:prstGeom>
-          <a:noFill/>
-        </p:spPr>
-        <p:txBody>
-          <a:bodyPr wrap="square" rtlCol="0">
-            <a:spAutoFit/>
-          </a:bodyPr>
-          <a:lstStyle/>
-          <a:p>
-            <a:pPr marL="171450" indent="-171450">
-              <a:buFont typeface="Arial" panose="020B0604020202020204" pitchFamily="34" charset="0"/>
-              <a:buChar char="•"/>
-            </a:pPr>
-            <a:r>
-              <a:rPr lang="en-US" sz="1000" dirty="0"/>
-              <a:t>Sputnik V</a:t>
-            </a:r>
-          </a:p>
-          <a:p>
-            <a:pPr marL="171450" indent="-171450">
-              <a:buFont typeface="Arial" panose="020B0604020202020204" pitchFamily="34" charset="0"/>
-              <a:buChar char="•"/>
-            </a:pPr>
-            <a:r>
-              <a:rPr lang="en-US" sz="1000" dirty="0" err="1"/>
-              <a:t>CoviVac</a:t>
-            </a:r>
-            <a:endParaRPr lang="en-US" sz="1000" dirty="0"/>
-          </a:p>
-        </p:txBody>
-      </p:sp>
-      <p:sp>
-        <p:nvSpPr>
-          <p:cNvPr id="14" name="TextBox 13">
-            <a:extLst>
-              <a:ext uri="{FF2B5EF4-FFF2-40B4-BE49-F238E27FC236}">
-                <a16:creationId xmlns:a16="http://schemas.microsoft.com/office/drawing/2014/main" id="{2FC48E23-5296-4864-9039-CDEF35A5FF88}"/>
-              </a:ext>
-            </a:extLst>
-          </p:cNvPr>
-          <p:cNvSpPr txBox="1"/>
-          <p:nvPr/>
-        </p:nvSpPr>
-        <p:spPr>
-          <a:xfrm>
-            <a:off x="4826356" y="4003020"/>
-            <a:ext cx="1067486" cy="400110"/>
-          </a:xfrm>
-          <a:prstGeom prst="rect">
-            <a:avLst/>
-          </a:prstGeom>
-          <a:noFill/>
-        </p:spPr>
-        <p:txBody>
-          <a:bodyPr wrap="square" rtlCol="0">
-            <a:spAutoFit/>
-          </a:bodyPr>
-          <a:lstStyle/>
-          <a:p>
-            <a:pPr marL="171450" indent="-171450">
-              <a:buFont typeface="Arial" panose="020B0604020202020204" pitchFamily="34" charset="0"/>
-              <a:buChar char="•"/>
-            </a:pPr>
-            <a:r>
-              <a:rPr lang="en-US" sz="1000" dirty="0" err="1"/>
-              <a:t>Bharet</a:t>
-            </a:r>
-            <a:r>
-              <a:rPr lang="en-US" sz="1000" dirty="0"/>
-              <a:t> (BIBCL.BO)</a:t>
-            </a:r>
-          </a:p>
-        </p:txBody>
-      </p:sp>
-      <p:sp>
-        <p:nvSpPr>
-          <p:cNvPr id="15" name="TextBox 14">
-            <a:extLst>
-              <a:ext uri="{FF2B5EF4-FFF2-40B4-BE49-F238E27FC236}">
-                <a16:creationId xmlns:a16="http://schemas.microsoft.com/office/drawing/2014/main" id="{B8A8CFD5-EE88-4117-96F1-445C61674F63}"/>
-              </a:ext>
-            </a:extLst>
-          </p:cNvPr>
-          <p:cNvSpPr txBox="1"/>
-          <p:nvPr/>
-        </p:nvSpPr>
-        <p:spPr>
-          <a:xfrm>
-            <a:off x="-1111377" y="1288625"/>
-            <a:ext cx="984070" cy="400110"/>
-          </a:xfrm>
-          <a:prstGeom prst="rect">
-            <a:avLst/>
-          </a:prstGeom>
-          <a:noFill/>
-        </p:spPr>
-        <p:txBody>
-          <a:bodyPr wrap="square" rtlCol="0">
-            <a:spAutoFit/>
-          </a:bodyPr>
-          <a:lstStyle/>
-          <a:p>
-            <a:pPr marL="171450" indent="-171450">
-              <a:buFont typeface="Arial" panose="020B0604020202020204" pitchFamily="34" charset="0"/>
-              <a:buChar char="•"/>
-            </a:pPr>
-            <a:r>
-              <a:rPr lang="en-US" sz="1000" dirty="0"/>
-              <a:t>PFE/BNTX</a:t>
-            </a:r>
-          </a:p>
-          <a:p>
-            <a:pPr marL="171450" indent="-171450">
-              <a:buFont typeface="Arial" panose="020B0604020202020204" pitchFamily="34" charset="0"/>
-              <a:buChar char="•"/>
-            </a:pPr>
-            <a:r>
-              <a:rPr lang="en-US" sz="1000" dirty="0"/>
-              <a:t>JNJ</a:t>
-            </a:r>
-          </a:p>
-        </p:txBody>
-      </p:sp>
-      <p:sp>
-        <p:nvSpPr>
-          <p:cNvPr id="16" name="TextBox 15">
-            <a:extLst>
-              <a:ext uri="{FF2B5EF4-FFF2-40B4-BE49-F238E27FC236}">
-                <a16:creationId xmlns:a16="http://schemas.microsoft.com/office/drawing/2014/main" id="{60CE26C2-25A3-499C-946A-3D844AECC472}"/>
-              </a:ext>
-            </a:extLst>
-          </p:cNvPr>
-          <p:cNvSpPr txBox="1"/>
-          <p:nvPr/>
-        </p:nvSpPr>
-        <p:spPr>
-          <a:xfrm>
-            <a:off x="-1111377" y="2080244"/>
-            <a:ext cx="984070" cy="246221"/>
-          </a:xfrm>
-          <a:prstGeom prst="rect">
-            <a:avLst/>
-          </a:prstGeom>
-          <a:noFill/>
-        </p:spPr>
-        <p:txBody>
-          <a:bodyPr wrap="square" rtlCol="0">
-            <a:spAutoFit/>
-          </a:bodyPr>
-          <a:lstStyle/>
-          <a:p>
-            <a:pPr marL="171450" indent="-171450">
-              <a:buFont typeface="Arial" panose="020B0604020202020204" pitchFamily="34" charset="0"/>
-              <a:buChar char="•"/>
-            </a:pPr>
-            <a:r>
-              <a:rPr lang="en-US" sz="1000" dirty="0"/>
-              <a:t>MRNA</a:t>
-            </a:r>
-          </a:p>
-        </p:txBody>
-      </p:sp>
-      <p:sp>
-        <p:nvSpPr>
-          <p:cNvPr id="17" name="TextBox 16">
-            <a:extLst>
-              <a:ext uri="{FF2B5EF4-FFF2-40B4-BE49-F238E27FC236}">
-                <a16:creationId xmlns:a16="http://schemas.microsoft.com/office/drawing/2014/main" id="{8702B209-0469-452C-90E2-408108B66313}"/>
-              </a:ext>
-            </a:extLst>
-          </p:cNvPr>
-          <p:cNvSpPr txBox="1"/>
-          <p:nvPr/>
-        </p:nvSpPr>
-        <p:spPr>
-          <a:xfrm>
-            <a:off x="-1111377" y="3001997"/>
-            <a:ext cx="623207" cy="246221"/>
-          </a:xfrm>
-          <a:prstGeom prst="rect">
-            <a:avLst/>
-          </a:prstGeom>
-          <a:noFill/>
-        </p:spPr>
-        <p:txBody>
-          <a:bodyPr wrap="square" rtlCol="0">
-            <a:spAutoFit/>
-          </a:bodyPr>
-          <a:lstStyle/>
-          <a:p>
-            <a:pPr marL="171450" indent="-171450">
-              <a:buFont typeface="Arial" panose="020B0604020202020204" pitchFamily="34" charset="0"/>
-              <a:buChar char="•"/>
-            </a:pPr>
-            <a:r>
-              <a:rPr lang="en-US" sz="1000" dirty="0"/>
-              <a:t>AZN</a:t>
-            </a:r>
-          </a:p>
-        </p:txBody>
-      </p:sp>
-      <p:sp>
-        <p:nvSpPr>
-          <p:cNvPr id="18" name="TextBox 17">
-            <a:extLst>
-              <a:ext uri="{FF2B5EF4-FFF2-40B4-BE49-F238E27FC236}">
-                <a16:creationId xmlns:a16="http://schemas.microsoft.com/office/drawing/2014/main" id="{FA87458E-DCBB-4F53-9F62-5CCF803D2578}"/>
-              </a:ext>
-            </a:extLst>
-          </p:cNvPr>
-          <p:cNvSpPr txBox="1"/>
-          <p:nvPr/>
-        </p:nvSpPr>
-        <p:spPr>
-          <a:xfrm>
-            <a:off x="-1111377" y="5664832"/>
-            <a:ext cx="1067487" cy="707886"/>
-          </a:xfrm>
-          <a:prstGeom prst="rect">
-            <a:avLst/>
-          </a:prstGeom>
-          <a:noFill/>
-        </p:spPr>
-        <p:txBody>
-          <a:bodyPr wrap="square" rtlCol="0">
-            <a:spAutoFit/>
-          </a:bodyPr>
-          <a:lstStyle/>
-          <a:p>
-            <a:pPr marL="171450" indent="-171450">
-              <a:buFont typeface="Arial" panose="020B0604020202020204" pitchFamily="34" charset="0"/>
-              <a:buChar char="•"/>
-            </a:pPr>
-            <a:r>
-              <a:rPr lang="en-US" sz="1000" dirty="0"/>
-              <a:t>SVA</a:t>
-            </a:r>
-          </a:p>
-          <a:p>
-            <a:pPr marL="171450" indent="-171450">
-              <a:buFont typeface="Arial" panose="020B0604020202020204" pitchFamily="34" charset="0"/>
-              <a:buChar char="•"/>
-            </a:pPr>
-            <a:r>
-              <a:rPr lang="en-US" sz="1000" dirty="0"/>
-              <a:t>SHTDY</a:t>
-            </a:r>
-          </a:p>
-          <a:p>
-            <a:pPr marL="171450" indent="-171450">
-              <a:buFont typeface="Arial" panose="020B0604020202020204" pitchFamily="34" charset="0"/>
-              <a:buChar char="•"/>
-            </a:pPr>
-            <a:r>
-              <a:rPr lang="en-US" sz="1000" dirty="0" err="1"/>
-              <a:t>CanSino</a:t>
-            </a:r>
-            <a:r>
-              <a:rPr lang="en-US" sz="1000" dirty="0"/>
-              <a:t> (6185.HK)</a:t>
-            </a:r>
-          </a:p>
-        </p:txBody>
-      </p:sp>
-      <p:sp>
-        <p:nvSpPr>
-          <p:cNvPr id="19" name="TextBox 18">
-            <a:extLst>
-              <a:ext uri="{FF2B5EF4-FFF2-40B4-BE49-F238E27FC236}">
-                <a16:creationId xmlns:a16="http://schemas.microsoft.com/office/drawing/2014/main" id="{AF77D5BD-E466-410D-AC72-AF6442A3BA1A}"/>
-              </a:ext>
-            </a:extLst>
-          </p:cNvPr>
-          <p:cNvSpPr txBox="1"/>
-          <p:nvPr/>
-        </p:nvSpPr>
-        <p:spPr>
-          <a:xfrm>
-            <a:off x="-1111377" y="3923750"/>
-            <a:ext cx="908548" cy="400110"/>
-          </a:xfrm>
-          <a:prstGeom prst="rect">
-            <a:avLst/>
-          </a:prstGeom>
-          <a:noFill/>
-        </p:spPr>
-        <p:txBody>
-          <a:bodyPr wrap="square" rtlCol="0">
-            <a:spAutoFit/>
-          </a:bodyPr>
-          <a:lstStyle/>
-          <a:p>
-            <a:pPr marL="171450" indent="-171450">
-              <a:buFont typeface="Arial" panose="020B0604020202020204" pitchFamily="34" charset="0"/>
-              <a:buChar char="•"/>
-            </a:pPr>
-            <a:r>
-              <a:rPr lang="en-US" sz="1000" dirty="0"/>
-              <a:t>Sputnik V</a:t>
-            </a:r>
-          </a:p>
-          <a:p>
-            <a:pPr marL="171450" indent="-171450">
-              <a:buFont typeface="Arial" panose="020B0604020202020204" pitchFamily="34" charset="0"/>
-              <a:buChar char="•"/>
-            </a:pPr>
-            <a:r>
-              <a:rPr lang="en-US" sz="1000" dirty="0" err="1"/>
-              <a:t>CoviVac</a:t>
-            </a:r>
-            <a:endParaRPr lang="en-US" sz="1000" dirty="0"/>
-          </a:p>
-        </p:txBody>
-      </p:sp>
-      <p:sp>
-        <p:nvSpPr>
-          <p:cNvPr id="20" name="TextBox 19">
-            <a:extLst>
-              <a:ext uri="{FF2B5EF4-FFF2-40B4-BE49-F238E27FC236}">
-                <a16:creationId xmlns:a16="http://schemas.microsoft.com/office/drawing/2014/main" id="{1C68CEC9-35BC-4DF2-8757-59A9DABA06BA}"/>
-              </a:ext>
-            </a:extLst>
-          </p:cNvPr>
-          <p:cNvSpPr txBox="1"/>
-          <p:nvPr/>
-        </p:nvSpPr>
-        <p:spPr>
-          <a:xfrm>
-            <a:off x="-1111377" y="4741980"/>
-            <a:ext cx="1067486" cy="400110"/>
-          </a:xfrm>
-          <a:prstGeom prst="rect">
-            <a:avLst/>
-          </a:prstGeom>
-          <a:noFill/>
-        </p:spPr>
-        <p:txBody>
-          <a:bodyPr wrap="square" rtlCol="0">
-            <a:spAutoFit/>
-          </a:bodyPr>
-          <a:lstStyle/>
-          <a:p>
-            <a:pPr marL="171450" indent="-171450">
-              <a:buFont typeface="Arial" panose="020B0604020202020204" pitchFamily="34" charset="0"/>
-              <a:buChar char="•"/>
-            </a:pPr>
-            <a:r>
-              <a:rPr lang="en-US" sz="1000" dirty="0" err="1"/>
-              <a:t>Bharet</a:t>
-            </a:r>
-            <a:r>
-              <a:rPr lang="en-US" sz="1000" dirty="0"/>
-              <a:t> (BIBCL.BO)</a:t>
-            </a:r>
-          </a:p>
-        </p:txBody>
-      </p:sp>
-      <p:sp>
-        <p:nvSpPr>
-          <p:cNvPr id="7" name="TextBox 6">
-            <a:extLst>
-              <a:ext uri="{FF2B5EF4-FFF2-40B4-BE49-F238E27FC236}">
-                <a16:creationId xmlns:a16="http://schemas.microsoft.com/office/drawing/2014/main" id="{E3608981-6C57-4817-B7FA-AB57D1FEA3CF}"/>
-              </a:ext>
-            </a:extLst>
-          </p:cNvPr>
-          <p:cNvSpPr txBox="1"/>
-          <p:nvPr/>
-        </p:nvSpPr>
-        <p:spPr>
-          <a:xfrm>
-            <a:off x="830076" y="4843702"/>
-            <a:ext cx="3842995" cy="584775"/>
-          </a:xfrm>
-          <a:prstGeom prst="rect">
-            <a:avLst/>
-          </a:prstGeom>
-          <a:noFill/>
-          <a:ln>
-            <a:solidFill>
-              <a:schemeClr val="tx1"/>
-            </a:solidFill>
-          </a:ln>
-        </p:spPr>
-        <p:txBody>
-          <a:bodyPr wrap="square" rtlCol="0">
-            <a:spAutoFit/>
-          </a:bodyPr>
-          <a:lstStyle/>
-          <a:p>
-            <a:r>
-              <a:rPr lang="en-US" sz="1600" b="1" dirty="0"/>
-              <a:t>Origin economies by number of approvals:</a:t>
-            </a:r>
-          </a:p>
-          <a:p>
-            <a:pPr marL="285750" indent="-285750">
-              <a:buFont typeface="Arial" panose="020B0604020202020204" pitchFamily="34" charset="0"/>
-              <a:buChar char="•"/>
-            </a:pPr>
-            <a:r>
-              <a:rPr lang="en-US" sz="1600" dirty="0"/>
-              <a:t>US/EU &gt; UK &gt; China &gt; US &gt; Russia &gt; India</a:t>
-            </a:r>
-          </a:p>
-        </p:txBody>
-      </p:sp>
-      <p:sp>
-        <p:nvSpPr>
-          <p:cNvPr id="22" name="TextBox 21">
-            <a:extLst>
-              <a:ext uri="{FF2B5EF4-FFF2-40B4-BE49-F238E27FC236}">
-                <a16:creationId xmlns:a16="http://schemas.microsoft.com/office/drawing/2014/main" id="{52B8F1C6-08AA-40C6-A54F-51F250FB80C8}"/>
-              </a:ext>
-            </a:extLst>
-          </p:cNvPr>
-          <p:cNvSpPr txBox="1"/>
-          <p:nvPr/>
-        </p:nvSpPr>
-        <p:spPr>
-          <a:xfrm>
-            <a:off x="6315281" y="5425801"/>
-            <a:ext cx="5735329" cy="1323439"/>
-          </a:xfrm>
-          <a:prstGeom prst="rect">
-            <a:avLst/>
-          </a:prstGeom>
-          <a:noFill/>
-          <a:ln>
-            <a:solidFill>
-              <a:schemeClr val="tx1"/>
-            </a:solidFill>
-          </a:ln>
-        </p:spPr>
-        <p:txBody>
-          <a:bodyPr wrap="square" rtlCol="0">
-            <a:spAutoFit/>
-          </a:bodyPr>
-          <a:lstStyle/>
-          <a:p>
-            <a:r>
-              <a:rPr lang="en-US" sz="1600" b="1" dirty="0"/>
-              <a:t>Evidence of protectionism? </a:t>
-            </a:r>
-          </a:p>
-          <a:p>
-            <a:pPr marL="285750" indent="-285750">
-              <a:buFont typeface="Arial" panose="020B0604020202020204" pitchFamily="34" charset="0"/>
-              <a:buChar char="•"/>
-            </a:pPr>
-            <a:r>
-              <a:rPr lang="en-US" sz="1600" dirty="0"/>
-              <a:t>US, China, Russia only approved their own vaccines.</a:t>
-            </a:r>
-          </a:p>
-          <a:p>
-            <a:r>
-              <a:rPr lang="en-US" sz="1600" b="1" dirty="0"/>
-              <a:t>Only 5 out of 19 jurisdictions approved vaccines from both America/Europe and Asia:</a:t>
-            </a:r>
-          </a:p>
-          <a:p>
-            <a:pPr marL="285750" indent="-285750">
-              <a:buFont typeface="Arial" panose="020B0604020202020204" pitchFamily="34" charset="0"/>
-              <a:buChar char="•"/>
-            </a:pPr>
-            <a:r>
-              <a:rPr lang="en-US" sz="1600" dirty="0"/>
-              <a:t>Thailand, Mexico, Indonesia, India, Brazil</a:t>
-            </a:r>
-          </a:p>
-        </p:txBody>
-      </p:sp>
-    </p:spTree>
-    <p:extLst>
-      <p:ext uri="{BB962C8B-B14F-4D97-AF65-F5344CB8AC3E}">
-        <p14:creationId xmlns:p14="http://schemas.microsoft.com/office/powerpoint/2010/main" val="3616281270"/>
-      </p:ext>
-    </p:extLst>
-  </p:cSld>
-  <p:clrMapOvr>
-    <a:masterClrMapping/>
-  </p:clrMapOvr>
-</p:sld>
-</file>
-
-<file path=ppt/slides/slide8.xml><?xml version="1.0" encoding="utf-8"?>
-<p:sld xmlns:a="http://schemas.openxmlformats.org/drawingml/2006/main" xmlns:r="http://schemas.openxmlformats.org/officeDocument/2006/relationships" xmlns:p="http://schemas.openxmlformats.org/presentationml/2006/main">
-  <p:cSld>
-    <p:spTree>
-      <p:nvGrpSpPr>
-        <p:cNvPr id="1" name=""/>
-        <p:cNvGrpSpPr/>
-        <p:nvPr/>
-      </p:nvGrpSpPr>
-      <p:grpSpPr>
-        <a:xfrm>
-          <a:off x="0" y="0"/>
-          <a:ext cx="0" cy="0"/>
-          <a:chOff x="0" y="0"/>
-          <a:chExt cx="0" cy="0"/>
-        </a:xfrm>
-      </p:grpSpPr>
-      <p:sp>
-        <p:nvSpPr>
           <p:cNvPr id="2" name="Title 1">
             <a:extLst>
               <a:ext uri="{FF2B5EF4-FFF2-40B4-BE49-F238E27FC236}">
@@ -9012,7 +7810,7 @@
 </p:sld>
 </file>
 
-<file path=ppt/slides/slide9.xml><?xml version="1.0" encoding="utf-8"?>
+<file path=ppt/slides/slide8.xml><?xml version="1.0" encoding="utf-8"?>
 <p:sld xmlns:a="http://schemas.openxmlformats.org/drawingml/2006/main" xmlns:r="http://schemas.openxmlformats.org/officeDocument/2006/relationships" xmlns:p="http://schemas.openxmlformats.org/presentationml/2006/main">
   <p:cSld>
     <p:spTree>
@@ -10006,6 +8804,208 @@
 </p:sld>
 </file>
 
+<file path=ppt/slides/slide9.xml><?xml version="1.0" encoding="utf-8"?>
+<p:sld xmlns:a="http://schemas.openxmlformats.org/drawingml/2006/main" xmlns:r="http://schemas.openxmlformats.org/officeDocument/2006/relationships" xmlns:p="http://schemas.openxmlformats.org/presentationml/2006/main">
+  <p:cSld>
+    <p:spTree>
+      <p:nvGrpSpPr>
+        <p:cNvPr id="1" name=""/>
+        <p:cNvGrpSpPr/>
+        <p:nvPr/>
+      </p:nvGrpSpPr>
+      <p:grpSpPr>
+        <a:xfrm>
+          <a:off x="0" y="0"/>
+          <a:ext cx="0" cy="0"/>
+          <a:chOff x="0" y="0"/>
+          <a:chExt cx="0" cy="0"/>
+        </a:xfrm>
+      </p:grpSpPr>
+      <p:sp>
+        <p:nvSpPr>
+          <p:cNvPr id="2" name="Title 1">
+            <a:extLst>
+              <a:ext uri="{FF2B5EF4-FFF2-40B4-BE49-F238E27FC236}">
+                <a16:creationId xmlns:a16="http://schemas.microsoft.com/office/drawing/2014/main" id="{520DB380-56C0-4E84-9ABE-F434C9CD1AAE}"/>
+              </a:ext>
+            </a:extLst>
+          </p:cNvPr>
+          <p:cNvSpPr>
+            <a:spLocks noGrp="1"/>
+          </p:cNvSpPr>
+          <p:nvPr>
+            <p:ph type="title"/>
+          </p:nvPr>
+        </p:nvSpPr>
+        <p:spPr/>
+        <p:txBody>
+          <a:bodyPr>
+            <a:noAutofit/>
+          </a:bodyPr>
+          <a:lstStyle/>
+          <a:p>
+            <a:r>
+              <a:rPr lang="en-US" sz="3200" dirty="0">
+                <a:solidFill>
+                  <a:srgbClr val="C00000"/>
+                </a:solidFill>
+              </a:rPr>
+              <a:t>US / EU / UK</a:t>
+            </a:r>
+            <a:br>
+              <a:rPr lang="en-US" sz="3200" dirty="0">
+                <a:solidFill>
+                  <a:srgbClr val="C00000"/>
+                </a:solidFill>
+              </a:rPr>
+            </a:br>
+            <a:r>
+              <a:rPr lang="en-US" sz="2000" dirty="0">
+                <a:solidFill>
+                  <a:srgbClr val="C00000"/>
+                </a:solidFill>
+              </a:rPr>
+              <a:t>Pfizer / BNTX</a:t>
+            </a:r>
+            <a:br>
+              <a:rPr lang="en-US" sz="2000" dirty="0">
+                <a:solidFill>
+                  <a:srgbClr val="C00000"/>
+                </a:solidFill>
+              </a:rPr>
+            </a:br>
+            <a:r>
+              <a:rPr lang="en-US" sz="2000" dirty="0" err="1">
+                <a:solidFill>
+                  <a:srgbClr val="C00000"/>
+                </a:solidFill>
+              </a:rPr>
+              <a:t>Moderna</a:t>
+            </a:r>
+            <a:br>
+              <a:rPr lang="en-US" sz="2000" dirty="0">
+                <a:solidFill>
+                  <a:srgbClr val="C00000"/>
+                </a:solidFill>
+              </a:rPr>
+            </a:br>
+            <a:r>
+              <a:rPr lang="en-US" sz="2000" dirty="0" err="1">
+                <a:solidFill>
+                  <a:srgbClr val="C00000"/>
+                </a:solidFill>
+              </a:rPr>
+              <a:t>AstraZenica</a:t>
+            </a:r>
+            <a:br>
+              <a:rPr lang="en-US" sz="2000" dirty="0">
+                <a:solidFill>
+                  <a:srgbClr val="C00000"/>
+                </a:solidFill>
+              </a:rPr>
+            </a:br>
+            <a:r>
+              <a:rPr lang="en-US" sz="2000" dirty="0">
+                <a:solidFill>
+                  <a:srgbClr val="C00000"/>
+                </a:solidFill>
+              </a:rPr>
+              <a:t>Johnson &amp; Johnson</a:t>
+            </a:r>
+            <a:br>
+              <a:rPr lang="en-US" sz="2000" dirty="0">
+                <a:solidFill>
+                  <a:srgbClr val="C00000"/>
+                </a:solidFill>
+              </a:rPr>
+            </a:br>
+            <a:endParaRPr lang="en-US" sz="2000" dirty="0"/>
+          </a:p>
+        </p:txBody>
+      </p:sp>
+      <p:pic>
+        <p:nvPicPr>
+          <p:cNvPr id="5" name="Picture 2">
+            <a:extLst>
+              <a:ext uri="{FF2B5EF4-FFF2-40B4-BE49-F238E27FC236}">
+                <a16:creationId xmlns:a16="http://schemas.microsoft.com/office/drawing/2014/main" id="{667FD92E-F5CC-4A1D-AEB7-EE4198369569}"/>
+              </a:ext>
+            </a:extLst>
+          </p:cNvPr>
+          <p:cNvPicPr>
+            <a:picLocks noChangeAspect="1" noChangeArrowheads="1"/>
+          </p:cNvPicPr>
+          <p:nvPr/>
+        </p:nvPicPr>
+        <p:blipFill rotWithShape="1">
+          <a:blip r:embed="rId2">
+            <a:extLst>
+              <a:ext uri="{28A0092B-C50C-407E-A947-70E740481C1C}">
+                <a14:useLocalDpi xmlns:a14="http://schemas.microsoft.com/office/drawing/2010/main" val="0"/>
+              </a:ext>
+            </a:extLst>
+          </a:blip>
+          <a:srcRect b="62173"/>
+          <a:stretch/>
+        </p:blipFill>
+        <p:spPr bwMode="auto">
+          <a:xfrm>
+            <a:off x="1280161" y="1566234"/>
+            <a:ext cx="8685759" cy="4747481"/>
+          </a:xfrm>
+          <a:prstGeom prst="rect">
+            <a:avLst/>
+          </a:prstGeom>
+          <a:noFill/>
+          <a:extLst>
+            <a:ext uri="{909E8E84-426E-40DD-AFC4-6F175D3DCCD1}">
+              <a14:hiddenFill xmlns:a14="http://schemas.microsoft.com/office/drawing/2010/main">
+                <a:solidFill>
+                  <a:srgbClr val="FFFFFF"/>
+                </a:solidFill>
+              </a14:hiddenFill>
+            </a:ext>
+          </a:extLst>
+        </p:spPr>
+      </p:pic>
+      <p:sp>
+        <p:nvSpPr>
+          <p:cNvPr id="3" name="Content Placeholder 2">
+            <a:extLst>
+              <a:ext uri="{FF2B5EF4-FFF2-40B4-BE49-F238E27FC236}">
+                <a16:creationId xmlns:a16="http://schemas.microsoft.com/office/drawing/2014/main" id="{B1FF1D46-032D-491B-A0E2-E4CA221A48F9}"/>
+              </a:ext>
+            </a:extLst>
+          </p:cNvPr>
+          <p:cNvSpPr>
+            <a:spLocks noGrp="1"/>
+          </p:cNvSpPr>
+          <p:nvPr>
+            <p:ph idx="1"/>
+          </p:nvPr>
+        </p:nvSpPr>
+        <p:spPr/>
+        <p:txBody>
+          <a:bodyPr/>
+          <a:lstStyle/>
+          <a:p>
+            <a:endParaRPr lang="en-US" dirty="0"/>
+          </a:p>
+        </p:txBody>
+      </p:sp>
+    </p:spTree>
+    <p:extLst>
+      <p:ext uri="{BB962C8B-B14F-4D97-AF65-F5344CB8AC3E}">
+        <p14:creationId xmlns:p14="http://schemas.microsoft.com/office/powerpoint/2010/main" val="1375394927"/>
+      </p:ext>
+    </p:extLst>
+  </p:cSld>
+  <p:clrMapOvr>
+    <a:masterClrMapping/>
+  </p:clrMapOvr>
+</p:sld>
+</file>
+
 <file path=ppt/theme/theme1.xml><?xml version="1.0" encoding="utf-8"?>
 <a:theme xmlns:a="http://schemas.openxmlformats.org/drawingml/2006/main" name="Office Theme">
   <a:themeElements>

</xml_diff>